<commit_message>
Re #447 Small changes to the generic projection from the discussion
</commit_message>
<xml_diff>
--- a/documentation/Old_documentation/design_forV4/FilebasedObjects&GenProjection.pptx
+++ b/documentation/Old_documentation/design_forV4/FilebasedObjects&GenProjection.pptx
@@ -15,6 +15,7 @@
     <p:sldId id="264" r:id="rId9"/>
     <p:sldId id="263" r:id="rId10"/>
     <p:sldId id="265" r:id="rId11"/>
+    <p:sldId id="266" r:id="rId12"/>
   </p:sldIdLst>
   <p:sldSz cx="12192000" cy="6858000"/>
   <p:notesSz cx="6858000" cy="9144000"/>
@@ -5385,6 +5386,13 @@
   <p:clrMapOvr>
     <a:masterClrMapping/>
   </p:clrMapOvr>
+  <p:timing>
+    <p:tnLst>
+      <p:par>
+        <p:cTn id="1" dur="indefinite" restart="never" nodeType="tmRoot"/>
+      </p:par>
+    </p:tnLst>
+  </p:timing>
 </p:sld>
 </file>
 
@@ -5836,6 +5844,146 @@
     <p:extLst>
       <p:ext uri="{BB962C8B-B14F-4D97-AF65-F5344CB8AC3E}">
         <p14:creationId xmlns:p14="http://schemas.microsoft.com/office/powerpoint/2010/main" val="1295912666"/>
+      </p:ext>
+    </p:extLst>
+  </p:cSld>
+  <p:clrMapOvr>
+    <a:masterClrMapping/>
+  </p:clrMapOvr>
+  <p:timing>
+    <p:tnLst>
+      <p:par>
+        <p:cTn id="1" dur="indefinite" restart="never" nodeType="tmRoot"/>
+      </p:par>
+    </p:tnLst>
+  </p:timing>
+</p:sld>
+</file>
+
+<file path=ppt/slides/slide11.xml><?xml version="1.0" encoding="utf-8"?>
+<p:sld xmlns:a="http://schemas.openxmlformats.org/drawingml/2006/main" xmlns:r="http://schemas.openxmlformats.org/officeDocument/2006/relationships" xmlns:p="http://schemas.openxmlformats.org/presentationml/2006/main">
+  <p:cSld>
+    <p:spTree>
+      <p:nvGrpSpPr>
+        <p:cNvPr id="1" name=""/>
+        <p:cNvGrpSpPr/>
+        <p:nvPr/>
+      </p:nvGrpSpPr>
+      <p:grpSpPr>
+        <a:xfrm>
+          <a:off x="0" y="0"/>
+          <a:ext cx="0" cy="0"/>
+          <a:chOff x="0" y="0"/>
+          <a:chExt cx="0" cy="0"/>
+        </a:xfrm>
+      </p:grpSpPr>
+      <p:sp>
+        <p:nvSpPr>
+          <p:cNvPr id="2" name="Title 1"/>
+          <p:cNvSpPr>
+            <a:spLocks noGrp="1"/>
+          </p:cNvSpPr>
+          <p:nvPr>
+            <p:ph type="title"/>
+          </p:nvPr>
+        </p:nvSpPr>
+        <p:spPr/>
+        <p:txBody>
+          <a:bodyPr/>
+          <a:lstStyle/>
+          <a:p>
+            <a:endParaRPr lang="en-GB"/>
+          </a:p>
+        </p:txBody>
+      </p:sp>
+      <p:sp>
+        <p:nvSpPr>
+          <p:cNvPr id="4" name="Rectangle 3"/>
+          <p:cNvSpPr/>
+          <p:nvPr/>
+        </p:nvSpPr>
+        <p:spPr>
+          <a:xfrm>
+            <a:off x="2846717" y="2950234"/>
+            <a:ext cx="4761781" cy="836762"/>
+          </a:xfrm>
+          <a:prstGeom prst="rect">
+            <a:avLst/>
+          </a:prstGeom>
+        </p:spPr>
+        <p:style>
+          <a:lnRef idx="2">
+            <a:schemeClr val="accent1">
+              <a:shade val="50000"/>
+            </a:schemeClr>
+          </a:lnRef>
+          <a:fillRef idx="1">
+            <a:schemeClr val="accent1"/>
+          </a:fillRef>
+          <a:effectRef idx="0">
+            <a:schemeClr val="accent1"/>
+          </a:effectRef>
+          <a:fontRef idx="minor">
+            <a:schemeClr val="lt1"/>
+          </a:fontRef>
+        </p:style>
+        <p:txBody>
+          <a:bodyPr rtlCol="0" anchor="ctr"/>
+          <a:lstStyle/>
+          <a:p>
+            <a:pPr algn="ctr"/>
+            <a:endParaRPr lang="en-GB"/>
+          </a:p>
+        </p:txBody>
+      </p:sp>
+      <p:sp>
+        <p:nvSpPr>
+          <p:cNvPr id="5" name="Donut 4"/>
+          <p:cNvSpPr/>
+          <p:nvPr/>
+        </p:nvSpPr>
+        <p:spPr>
+          <a:xfrm>
+            <a:off x="4632385" y="3096972"/>
+            <a:ext cx="1923691" cy="1932317"/>
+          </a:xfrm>
+          <a:prstGeom prst="donut">
+            <a:avLst/>
+          </a:prstGeom>
+        </p:spPr>
+        <p:style>
+          <a:lnRef idx="2">
+            <a:schemeClr val="accent1">
+              <a:shade val="50000"/>
+            </a:schemeClr>
+          </a:lnRef>
+          <a:fillRef idx="1">
+            <a:schemeClr val="accent1"/>
+          </a:fillRef>
+          <a:effectRef idx="0">
+            <a:schemeClr val="accent1"/>
+          </a:effectRef>
+          <a:fontRef idx="minor">
+            <a:schemeClr val="lt1"/>
+          </a:fontRef>
+        </p:style>
+        <p:txBody>
+          <a:bodyPr rtlCol="0" anchor="ctr"/>
+          <a:lstStyle/>
+          <a:p>
+            <a:pPr algn="ctr"/>
+            <a:endParaRPr lang="en-GB">
+              <a:solidFill>
+                <a:schemeClr val="tx1"/>
+              </a:solidFill>
+            </a:endParaRPr>
+          </a:p>
+        </p:txBody>
+      </p:sp>
+    </p:spTree>
+    <p:extLst>
+      <p:ext uri="{BB962C8B-B14F-4D97-AF65-F5344CB8AC3E}">
+        <p14:creationId xmlns:p14="http://schemas.microsoft.com/office/powerpoint/2010/main" val="2377110048"/>
       </p:ext>
     </p:extLst>
   </p:cSld>
@@ -9677,6 +9825,13 @@
   <p:clrMapOvr>
     <a:masterClrMapping/>
   </p:clrMapOvr>
+  <p:timing>
+    <p:tnLst>
+      <p:par>
+        <p:cTn id="1" dur="indefinite" restart="never" nodeType="tmRoot"/>
+      </p:par>
+    </p:tnLst>
+  </p:timing>
 </p:sld>
 </file>
 
@@ -13173,6 +13328,13 @@
   <p:clrMapOvr>
     <a:masterClrMapping/>
   </p:clrMapOvr>
+  <p:timing>
+    <p:tnLst>
+      <p:par>
+        <p:cTn id="1" dur="indefinite" restart="never" nodeType="tmRoot"/>
+      </p:par>
+    </p:tnLst>
+  </p:timing>
 </p:sld>
 </file>
 
@@ -13295,6 +13457,13 @@
   <p:clrMapOvr>
     <a:masterClrMapping/>
   </p:clrMapOvr>
+  <p:timing>
+    <p:tnLst>
+      <p:par>
+        <p:cTn id="1" dur="indefinite" restart="never" nodeType="tmRoot"/>
+      </p:par>
+    </p:tnLst>
+  </p:timing>
 </p:sld>
 </file>
 
@@ -13332,11 +13501,7 @@
           <a:p>
             <a:r>
               <a:rPr lang="en-GB" dirty="0" smtClean="0"/>
-              <a:t>Parts of new SQW </a:t>
-            </a:r>
-            <a:r>
-              <a:rPr lang="en-GB" dirty="0" smtClean="0"/>
-              <a:t>object (</a:t>
+              <a:t>Parts of new SQW object (</a:t>
             </a:r>
             <a:r>
               <a:rPr lang="en-GB" dirty="0" err="1" smtClean="0"/>
@@ -13366,7 +13531,7 @@
         </p:blipFill>
         <p:spPr>
           <a:xfrm>
-            <a:off x="653143" y="1962149"/>
+            <a:off x="687648" y="1953523"/>
             <a:ext cx="10248686" cy="4580165"/>
           </a:xfrm>
           <a:prstGeom prst="rect">
@@ -13440,6 +13605,13 @@
   <p:clrMapOvr>
     <a:masterClrMapping/>
   </p:clrMapOvr>
+  <p:timing>
+    <p:tnLst>
+      <p:par>
+        <p:cTn id="1" dur="indefinite" restart="never" nodeType="tmRoot"/>
+      </p:par>
+    </p:tnLst>
+  </p:timing>
 </p:sld>
 </file>
 
@@ -13517,6 +13689,13 @@
   <p:clrMapOvr>
     <a:masterClrMapping/>
   </p:clrMapOvr>
+  <p:timing>
+    <p:tnLst>
+      <p:par>
+        <p:cTn id="1" dur="indefinite" restart="never" nodeType="tmRoot"/>
+      </p:par>
+    </p:tnLst>
+  </p:timing>
 </p:sld>
 </file>
 
@@ -13673,12 +13852,13 @@
           <a:p>
             <a:r>
               <a:rPr lang="en-GB" b="1" dirty="0"/>
-              <a:t>projection</a:t>
-            </a:r>
-            <a:r>
-              <a:rPr lang="en-GB" dirty="0"/>
+              <a:t>projection </a:t>
+            </a:r>
+            <a:r>
+              <a:rPr lang="en-GB" dirty="0" smtClean="0"/>
               <a:t>:</a:t>
             </a:r>
+            <a:endParaRPr lang="en-GB" dirty="0"/>
           </a:p>
           <a:p>
             <a:r>
@@ -13694,17 +13874,10 @@
               <a:t>(axis_block0</a:t>
             </a:r>
             <a:r>
-              <a:rPr lang="en-GB" dirty="0"/>
-              <a:t>,                   </a:t>
-            </a:r>
-            <a:r>
-              <a:rPr lang="en-GB" dirty="0" err="1"/>
-              <a:t>Input_parameters</a:t>
-            </a:r>
-            <a:r>
               <a:rPr lang="en-GB" dirty="0" smtClean="0"/>
-              <a:t>)</a:t>
-            </a:r>
+              <a:t>,[1:10],[])</a:t>
+            </a:r>
+            <a:endParaRPr lang="en-GB" dirty="0" smtClean="0"/>
           </a:p>
           <a:p>
             <a:endParaRPr lang="en-GB" dirty="0" smtClean="0"/>
@@ -13716,8 +13889,25 @@
             </a:r>
             <a:r>
               <a:rPr lang="en-GB" dirty="0" smtClean="0"/>
-              <a:t> = axis_block1.get_grid()</a:t>
-            </a:r>
+              <a:t> = </a:t>
+            </a:r>
+            <a:r>
+              <a:rPr lang="en-GB" dirty="0" smtClean="0"/>
+              <a:t>axis_block1.get_grid(</a:t>
+            </a:r>
+            <a:r>
+              <a:rPr lang="en-GB" b="1" dirty="0"/>
+              <a:t>projection</a:t>
+            </a:r>
+            <a:r>
+              <a:rPr lang="en-GB" dirty="0" smtClean="0"/>
+              <a:t>,axis_block0</a:t>
+            </a:r>
+            <a:r>
+              <a:rPr lang="en-GB" dirty="0"/>
+              <a:t>)</a:t>
+            </a:r>
+            <a:endParaRPr lang="en-GB" dirty="0" smtClean="0"/>
           </a:p>
           <a:p>
             <a:endParaRPr lang="en-GB" dirty="0"/>
@@ -14152,6 +14342,13 @@
   <p:clrMapOvr>
     <a:masterClrMapping/>
   </p:clrMapOvr>
+  <p:timing>
+    <p:tnLst>
+      <p:par>
+        <p:cTn id="1" dur="indefinite" restart="never" nodeType="tmRoot"/>
+      </p:par>
+    </p:tnLst>
+  </p:timing>
 </p:sld>
 </file>
 
@@ -14251,9 +14448,14 @@
           <a:lstStyle/>
           <a:p>
             <a:r>
-              <a:rPr lang="en-GB" dirty="0"/>
-              <a:t>projection:</a:t>
-            </a:r>
+              <a:rPr lang="en-GB" dirty="0" err="1" smtClean="0"/>
+              <a:t>Proj_spherical</a:t>
+            </a:r>
+            <a:r>
+              <a:rPr lang="en-GB" dirty="0" smtClean="0"/>
+              <a:t>:</a:t>
+            </a:r>
+            <a:endParaRPr lang="en-GB" dirty="0"/>
           </a:p>
           <a:p>
             <a:r>
@@ -14603,6 +14805,66 @@
           </a:p>
         </p:txBody>
       </p:sp>
+      <p:cxnSp>
+        <p:nvCxnSpPr>
+          <p:cNvPr id="6" name="Straight Connector 5"/>
+          <p:cNvCxnSpPr/>
+          <p:nvPr/>
+        </p:nvCxnSpPr>
+        <p:spPr>
+          <a:xfrm>
+            <a:off x="1595887" y="3907766"/>
+            <a:ext cx="1115309" cy="672860"/>
+          </a:xfrm>
+          <a:prstGeom prst="line">
+            <a:avLst/>
+          </a:prstGeom>
+        </p:spPr>
+        <p:style>
+          <a:lnRef idx="1">
+            <a:schemeClr val="accent1"/>
+          </a:lnRef>
+          <a:fillRef idx="0">
+            <a:schemeClr val="accent1"/>
+          </a:fillRef>
+          <a:effectRef idx="0">
+            <a:schemeClr val="accent1"/>
+          </a:effectRef>
+          <a:fontRef idx="minor">
+            <a:schemeClr val="tx1"/>
+          </a:fontRef>
+        </p:style>
+      </p:cxnSp>
+      <p:cxnSp>
+        <p:nvCxnSpPr>
+          <p:cNvPr id="10" name="Straight Connector 9"/>
+          <p:cNvCxnSpPr/>
+          <p:nvPr/>
+        </p:nvCxnSpPr>
+        <p:spPr>
+          <a:xfrm flipH="1" flipV="1">
+            <a:off x="2518913" y="3485072"/>
+            <a:ext cx="192283" cy="1112808"/>
+          </a:xfrm>
+          <a:prstGeom prst="line">
+            <a:avLst/>
+          </a:prstGeom>
+        </p:spPr>
+        <p:style>
+          <a:lnRef idx="1">
+            <a:schemeClr val="accent1"/>
+          </a:lnRef>
+          <a:fillRef idx="0">
+            <a:schemeClr val="accent1"/>
+          </a:fillRef>
+          <a:effectRef idx="0">
+            <a:schemeClr val="accent1"/>
+          </a:effectRef>
+          <a:fontRef idx="minor">
+            <a:schemeClr val="tx1"/>
+          </a:fontRef>
+        </p:style>
+      </p:cxnSp>
     </p:spTree>
     <p:extLst>
       <p:ext uri="{BB962C8B-B14F-4D97-AF65-F5344CB8AC3E}">
@@ -14613,6 +14875,13 @@
   <p:clrMapOvr>
     <a:masterClrMapping/>
   </p:clrMapOvr>
+  <p:timing>
+    <p:tnLst>
+      <p:par>
+        <p:cTn id="1" dur="indefinite" restart="never" nodeType="tmRoot"/>
+      </p:par>
+    </p:tnLst>
+  </p:timing>
 </p:sld>
 </file>
 
@@ -15240,6 +15509,13 @@
   <p:clrMapOvr>
     <a:masterClrMapping/>
   </p:clrMapOvr>
+  <p:timing>
+    <p:tnLst>
+      <p:par>
+        <p:cTn id="1" dur="indefinite" restart="never" nodeType="tmRoot"/>
+      </p:par>
+    </p:tnLst>
+  </p:timing>
 </p:sld>
 </file>
 

</xml_diff>

<commit_message>
Re #447 fixing loaders
Former-commit-id: e85d434c247f37c6a19b05f1da66a47ead3909b7
</commit_message>
<xml_diff>
--- a/documentation/Old_documentation/design_forV4/FilebasedObjects&GenProjection.pptx
+++ b/documentation/Old_documentation/design_forV4/FilebasedObjects&GenProjection.pptx
@@ -253,7 +253,7 @@
           <a:p>
             <a:fld id="{3F5A1AD9-98D0-4926-A662-690A33481C0C}" type="datetimeFigureOut">
               <a:rPr lang="en-GB" smtClean="0"/>
-              <a:t>14/12/2020</a:t>
+              <a:t>15/12/2020</a:t>
             </a:fld>
             <a:endParaRPr lang="en-GB"/>
           </a:p>
@@ -423,7 +423,7 @@
           <a:p>
             <a:fld id="{3F5A1AD9-98D0-4926-A662-690A33481C0C}" type="datetimeFigureOut">
               <a:rPr lang="en-GB" smtClean="0"/>
-              <a:t>14/12/2020</a:t>
+              <a:t>15/12/2020</a:t>
             </a:fld>
             <a:endParaRPr lang="en-GB"/>
           </a:p>
@@ -603,7 +603,7 @@
           <a:p>
             <a:fld id="{3F5A1AD9-98D0-4926-A662-690A33481C0C}" type="datetimeFigureOut">
               <a:rPr lang="en-GB" smtClean="0"/>
-              <a:t>14/12/2020</a:t>
+              <a:t>15/12/2020</a:t>
             </a:fld>
             <a:endParaRPr lang="en-GB"/>
           </a:p>
@@ -773,7 +773,7 @@
           <a:p>
             <a:fld id="{3F5A1AD9-98D0-4926-A662-690A33481C0C}" type="datetimeFigureOut">
               <a:rPr lang="en-GB" smtClean="0"/>
-              <a:t>14/12/2020</a:t>
+              <a:t>15/12/2020</a:t>
             </a:fld>
             <a:endParaRPr lang="en-GB"/>
           </a:p>
@@ -1019,7 +1019,7 @@
           <a:p>
             <a:fld id="{3F5A1AD9-98D0-4926-A662-690A33481C0C}" type="datetimeFigureOut">
               <a:rPr lang="en-GB" smtClean="0"/>
-              <a:t>14/12/2020</a:t>
+              <a:t>15/12/2020</a:t>
             </a:fld>
             <a:endParaRPr lang="en-GB"/>
           </a:p>
@@ -1251,7 +1251,7 @@
           <a:p>
             <a:fld id="{3F5A1AD9-98D0-4926-A662-690A33481C0C}" type="datetimeFigureOut">
               <a:rPr lang="en-GB" smtClean="0"/>
-              <a:t>14/12/2020</a:t>
+              <a:t>15/12/2020</a:t>
             </a:fld>
             <a:endParaRPr lang="en-GB"/>
           </a:p>
@@ -1618,7 +1618,7 @@
           <a:p>
             <a:fld id="{3F5A1AD9-98D0-4926-A662-690A33481C0C}" type="datetimeFigureOut">
               <a:rPr lang="en-GB" smtClean="0"/>
-              <a:t>14/12/2020</a:t>
+              <a:t>15/12/2020</a:t>
             </a:fld>
             <a:endParaRPr lang="en-GB"/>
           </a:p>
@@ -1736,7 +1736,7 @@
           <a:p>
             <a:fld id="{3F5A1AD9-98D0-4926-A662-690A33481C0C}" type="datetimeFigureOut">
               <a:rPr lang="en-GB" smtClean="0"/>
-              <a:t>14/12/2020</a:t>
+              <a:t>15/12/2020</a:t>
             </a:fld>
             <a:endParaRPr lang="en-GB"/>
           </a:p>
@@ -1831,7 +1831,7 @@
           <a:p>
             <a:fld id="{3F5A1AD9-98D0-4926-A662-690A33481C0C}" type="datetimeFigureOut">
               <a:rPr lang="en-GB" smtClean="0"/>
-              <a:t>14/12/2020</a:t>
+              <a:t>15/12/2020</a:t>
             </a:fld>
             <a:endParaRPr lang="en-GB"/>
           </a:p>
@@ -2108,7 +2108,7 @@
           <a:p>
             <a:fld id="{3F5A1AD9-98D0-4926-A662-690A33481C0C}" type="datetimeFigureOut">
               <a:rPr lang="en-GB" smtClean="0"/>
-              <a:t>14/12/2020</a:t>
+              <a:t>15/12/2020</a:t>
             </a:fld>
             <a:endParaRPr lang="en-GB"/>
           </a:p>
@@ -2361,7 +2361,7 @@
           <a:p>
             <a:fld id="{3F5A1AD9-98D0-4926-A662-690A33481C0C}" type="datetimeFigureOut">
               <a:rPr lang="en-GB" smtClean="0"/>
-              <a:t>14/12/2020</a:t>
+              <a:t>15/12/2020</a:t>
             </a:fld>
             <a:endParaRPr lang="en-GB"/>
           </a:p>
@@ -2574,7 +2574,7 @@
           <a:p>
             <a:fld id="{3F5A1AD9-98D0-4926-A662-690A33481C0C}" type="datetimeFigureOut">
               <a:rPr lang="en-GB" smtClean="0"/>
-              <a:t>14/12/2020</a:t>
+              <a:t>15/12/2020</a:t>
             </a:fld>
             <a:endParaRPr lang="en-GB"/>
           </a:p>
@@ -13580,12 +13580,20 @@
           <a:p>
             <a:pPr algn="ctr"/>
             <a:r>
+              <a:rPr lang="en-GB" dirty="0" err="1">
+                <a:solidFill>
+                  <a:schemeClr val="tx1"/>
+                </a:solidFill>
+              </a:rPr>
+              <a:t>n</a:t>
+            </a:r>
+            <a:r>
               <a:rPr lang="en-GB" dirty="0" err="1" smtClean="0">
                 <a:solidFill>
                   <a:schemeClr val="tx1"/>
                 </a:solidFill>
               </a:rPr>
-              <a:t>Npix_to_pix_positions</a:t>
+              <a:t>pix_to_pix_positions</a:t>
             </a:r>
             <a:endParaRPr lang="en-GB" dirty="0">
               <a:solidFill>
@@ -13831,8 +13839,8 @@
         </p:nvSpPr>
         <p:spPr>
           <a:xfrm>
-            <a:off x="6059425" y="1321356"/>
-            <a:ext cx="5851316" cy="3693319"/>
+            <a:off x="5016524" y="1321356"/>
+            <a:ext cx="6894217" cy="4801314"/>
           </a:xfrm>
           <a:prstGeom prst="rect">
             <a:avLst/>
@@ -13851,8 +13859,12 @@
           <a:lstStyle/>
           <a:p>
             <a:r>
-              <a:rPr lang="en-GB" b="1" dirty="0"/>
-              <a:t>projection </a:t>
+              <a:rPr lang="en-GB" b="1" dirty="0" err="1" smtClean="0"/>
+              <a:t>proj_</a:t>
+            </a:r>
+            <a:r>
+              <a:rPr lang="en-GB" b="1" dirty="0" err="1" smtClean="0"/>
+              <a:t>rec</a:t>
             </a:r>
             <a:r>
               <a:rPr lang="en-GB" dirty="0" smtClean="0"/>
@@ -13871,42 +13883,87 @@
             </a:r>
             <a:r>
               <a:rPr lang="en-GB" dirty="0" smtClean="0"/>
-              <a:t>(axis_block0</a:t>
+              <a:t>(axis_block0,[1:10],[])</a:t>
+            </a:r>
+          </a:p>
+          <a:p>
+            <a:endParaRPr lang="en-GB" dirty="0" smtClean="0"/>
+          </a:p>
+          <a:p>
+            <a:r>
+              <a:rPr lang="en-GB" dirty="0" err="1" smtClean="0"/>
+              <a:t>old_bins_in_new_coord_system</a:t>
             </a:r>
             <a:r>
               <a:rPr lang="en-GB" dirty="0" smtClean="0"/>
-              <a:t>,[1:10],[])</a:t>
+              <a:t> </a:t>
+            </a:r>
+            <a:r>
+              <a:rPr lang="en-GB" dirty="0" smtClean="0"/>
+              <a:t>= </a:t>
+            </a:r>
+            <a:r>
+              <a:rPr lang="en-GB" dirty="0" smtClean="0"/>
+              <a:t>axis_block0.bin_grid(</a:t>
+            </a:r>
+            <a:r>
+              <a:rPr lang="en-GB" b="1" dirty="0"/>
+              <a:t>proj_rec</a:t>
+            </a:r>
+            <a:r>
+              <a:rPr lang="en-GB" dirty="0" smtClean="0"/>
+              <a:t>,axis_block1)</a:t>
+            </a:r>
+          </a:p>
+          <a:p>
+            <a:r>
+              <a:rPr lang="en-GB" dirty="0"/>
+              <a:t> </a:t>
+            </a:r>
+            <a:r>
+              <a:rPr lang="en-GB" dirty="0" smtClean="0"/>
+              <a:t>                 ---------------------------------------</a:t>
             </a:r>
             <a:endParaRPr lang="en-GB" dirty="0" smtClean="0"/>
           </a:p>
           <a:p>
+            <a:r>
+              <a:rPr lang="en-GB" dirty="0" smtClean="0"/>
+              <a:t>	grid0 </a:t>
+            </a:r>
+            <a:r>
+              <a:rPr lang="en-GB" smtClean="0"/>
+              <a:t>= axis_block0.get_grid(proj0);</a:t>
+            </a:r>
             <a:endParaRPr lang="en-GB" dirty="0" smtClean="0"/>
           </a:p>
           <a:p>
             <a:r>
+              <a:rPr lang="en-GB" b="1" dirty="0" smtClean="0"/>
+              <a:t>          	</a:t>
+            </a:r>
+            <a:r>
+              <a:rPr lang="en-GB" dirty="0" smtClean="0"/>
+              <a:t>grid0_conv=</a:t>
+            </a:r>
+            <a:r>
+              <a:rPr lang="en-GB" b="1" dirty="0" smtClean="0"/>
+              <a:t> </a:t>
+            </a:r>
+            <a:r>
+              <a:rPr lang="en-GB" b="1" dirty="0" err="1" smtClean="0"/>
+              <a:t>proj_rec</a:t>
+            </a:r>
+            <a:r>
               <a:rPr lang="en-GB" dirty="0" err="1" smtClean="0"/>
-              <a:t>new_bin_coord_in_old</a:t>
+              <a:t>.convert_to_new_coord</a:t>
             </a:r>
             <a:r>
               <a:rPr lang="en-GB" dirty="0" smtClean="0"/>
-              <a:t> = </a:t>
-            </a:r>
-            <a:r>
-              <a:rPr lang="en-GB" dirty="0" smtClean="0"/>
-              <a:t>axis_block1.get_grid(</a:t>
-            </a:r>
-            <a:r>
-              <a:rPr lang="en-GB" b="1" dirty="0"/>
-              <a:t>projection</a:t>
-            </a:r>
-            <a:r>
-              <a:rPr lang="en-GB" dirty="0" smtClean="0"/>
-              <a:t>,axis_block0</a:t>
-            </a:r>
-            <a:r>
-              <a:rPr lang="en-GB" dirty="0"/>
-              <a:t>)</a:t>
-            </a:r>
+              <a:t>(grid0)</a:t>
+            </a:r>
+          </a:p>
+          <a:p>
             <a:endParaRPr lang="en-GB" dirty="0" smtClean="0"/>
           </a:p>
           <a:p>
@@ -13994,11 +14051,13 @@
         </p:nvCxnSpPr>
         <p:spPr>
           <a:xfrm rot="5400000" flipH="1" flipV="1">
-            <a:off x="3369588" y="1139366"/>
-            <a:ext cx="2293011" cy="3086664"/>
+            <a:off x="2846660" y="1659338"/>
+            <a:ext cx="2295967" cy="2043765"/>
           </a:xfrm>
-          <a:prstGeom prst="bentConnector2">
-            <a:avLst/>
+          <a:prstGeom prst="bentConnector3">
+            <a:avLst>
+              <a:gd name="adj1" fmla="val 99884"/>
+            </a:avLst>
           </a:prstGeom>
           <a:ln>
             <a:solidFill>

</xml_diff>

<commit_message>
Re #485 reviewed documentation
</commit_message>
<xml_diff>
--- a/documentation/Old_documentation/design_forV4/FilebasedObjects&GenProjection.pptx
+++ b/documentation/Old_documentation/design_forV4/FilebasedObjects&GenProjection.pptx
@@ -253,7 +253,7 @@
           <a:p>
             <a:fld id="{3F5A1AD9-98D0-4926-A662-690A33481C0C}" type="datetimeFigureOut">
               <a:rPr lang="en-GB" smtClean="0"/>
-              <a:t>15/12/2020</a:t>
+              <a:t>17/01/2021</a:t>
             </a:fld>
             <a:endParaRPr lang="en-GB"/>
           </a:p>
@@ -423,7 +423,7 @@
           <a:p>
             <a:fld id="{3F5A1AD9-98D0-4926-A662-690A33481C0C}" type="datetimeFigureOut">
               <a:rPr lang="en-GB" smtClean="0"/>
-              <a:t>15/12/2020</a:t>
+              <a:t>17/01/2021</a:t>
             </a:fld>
             <a:endParaRPr lang="en-GB"/>
           </a:p>
@@ -603,7 +603,7 @@
           <a:p>
             <a:fld id="{3F5A1AD9-98D0-4926-A662-690A33481C0C}" type="datetimeFigureOut">
               <a:rPr lang="en-GB" smtClean="0"/>
-              <a:t>15/12/2020</a:t>
+              <a:t>17/01/2021</a:t>
             </a:fld>
             <a:endParaRPr lang="en-GB"/>
           </a:p>
@@ -773,7 +773,7 @@
           <a:p>
             <a:fld id="{3F5A1AD9-98D0-4926-A662-690A33481C0C}" type="datetimeFigureOut">
               <a:rPr lang="en-GB" smtClean="0"/>
-              <a:t>15/12/2020</a:t>
+              <a:t>17/01/2021</a:t>
             </a:fld>
             <a:endParaRPr lang="en-GB"/>
           </a:p>
@@ -1019,7 +1019,7 @@
           <a:p>
             <a:fld id="{3F5A1AD9-98D0-4926-A662-690A33481C0C}" type="datetimeFigureOut">
               <a:rPr lang="en-GB" smtClean="0"/>
-              <a:t>15/12/2020</a:t>
+              <a:t>17/01/2021</a:t>
             </a:fld>
             <a:endParaRPr lang="en-GB"/>
           </a:p>
@@ -1251,7 +1251,7 @@
           <a:p>
             <a:fld id="{3F5A1AD9-98D0-4926-A662-690A33481C0C}" type="datetimeFigureOut">
               <a:rPr lang="en-GB" smtClean="0"/>
-              <a:t>15/12/2020</a:t>
+              <a:t>17/01/2021</a:t>
             </a:fld>
             <a:endParaRPr lang="en-GB"/>
           </a:p>
@@ -1618,7 +1618,7 @@
           <a:p>
             <a:fld id="{3F5A1AD9-98D0-4926-A662-690A33481C0C}" type="datetimeFigureOut">
               <a:rPr lang="en-GB" smtClean="0"/>
-              <a:t>15/12/2020</a:t>
+              <a:t>17/01/2021</a:t>
             </a:fld>
             <a:endParaRPr lang="en-GB"/>
           </a:p>
@@ -1736,7 +1736,7 @@
           <a:p>
             <a:fld id="{3F5A1AD9-98D0-4926-A662-690A33481C0C}" type="datetimeFigureOut">
               <a:rPr lang="en-GB" smtClean="0"/>
-              <a:t>15/12/2020</a:t>
+              <a:t>17/01/2021</a:t>
             </a:fld>
             <a:endParaRPr lang="en-GB"/>
           </a:p>
@@ -1831,7 +1831,7 @@
           <a:p>
             <a:fld id="{3F5A1AD9-98D0-4926-A662-690A33481C0C}" type="datetimeFigureOut">
               <a:rPr lang="en-GB" smtClean="0"/>
-              <a:t>15/12/2020</a:t>
+              <a:t>17/01/2021</a:t>
             </a:fld>
             <a:endParaRPr lang="en-GB"/>
           </a:p>
@@ -2108,7 +2108,7 @@
           <a:p>
             <a:fld id="{3F5A1AD9-98D0-4926-A662-690A33481C0C}" type="datetimeFigureOut">
               <a:rPr lang="en-GB" smtClean="0"/>
-              <a:t>15/12/2020</a:t>
+              <a:t>17/01/2021</a:t>
             </a:fld>
             <a:endParaRPr lang="en-GB"/>
           </a:p>
@@ -2361,7 +2361,7 @@
           <a:p>
             <a:fld id="{3F5A1AD9-98D0-4926-A662-690A33481C0C}" type="datetimeFigureOut">
               <a:rPr lang="en-GB" smtClean="0"/>
-              <a:t>15/12/2020</a:t>
+              <a:t>17/01/2021</a:t>
             </a:fld>
             <a:endParaRPr lang="en-GB"/>
           </a:p>
@@ -2574,7 +2574,7 @@
           <a:p>
             <a:fld id="{3F5A1AD9-98D0-4926-A662-690A33481C0C}" type="datetimeFigureOut">
               <a:rPr lang="en-GB" smtClean="0"/>
-              <a:t>15/12/2020</a:t>
+              <a:t>17/01/2021</a:t>
             </a:fld>
             <a:endParaRPr lang="en-GB"/>
           </a:p>
@@ -13484,40 +13484,9 @@
           <a:chExt cx="0" cy="0"/>
         </a:xfrm>
       </p:grpSpPr>
-      <p:sp>
-        <p:nvSpPr>
-          <p:cNvPr id="2" name="Title 1"/>
-          <p:cNvSpPr>
-            <a:spLocks noGrp="1"/>
-          </p:cNvSpPr>
-          <p:nvPr>
-            <p:ph type="title"/>
-          </p:nvPr>
-        </p:nvSpPr>
-        <p:spPr/>
-        <p:txBody>
-          <a:bodyPr/>
-          <a:lstStyle/>
-          <a:p>
-            <a:r>
-              <a:rPr lang="en-GB" dirty="0" smtClean="0"/>
-              <a:t>Parts of new SQW object (</a:t>
-            </a:r>
-            <a:r>
-              <a:rPr lang="en-GB" dirty="0" err="1" smtClean="0"/>
-              <a:t>DND+pixels</a:t>
-            </a:r>
-            <a:r>
-              <a:rPr lang="en-GB" dirty="0" smtClean="0"/>
-              <a:t>):</a:t>
-            </a:r>
-            <a:endParaRPr lang="en-GB" dirty="0"/>
-          </a:p>
-        </p:txBody>
-      </p:sp>
       <p:pic>
         <p:nvPicPr>
-          <p:cNvPr id="5" name="Picture 4"/>
+          <p:cNvPr id="7" name="Picture 6"/>
           <p:cNvPicPr>
             <a:picLocks noChangeAspect="1"/>
           </p:cNvPicPr>
@@ -13531,8 +13500,68 @@
         </p:blipFill>
         <p:spPr>
           <a:xfrm>
-            <a:off x="687648" y="1953523"/>
-            <a:ext cx="10248686" cy="4580165"/>
+            <a:off x="1825096" y="1912934"/>
+            <a:ext cx="10353675" cy="4962525"/>
+          </a:xfrm>
+          <a:prstGeom prst="rect">
+            <a:avLst/>
+          </a:prstGeom>
+        </p:spPr>
+      </p:pic>
+      <p:sp>
+        <p:nvSpPr>
+          <p:cNvPr id="2" name="Title 1"/>
+          <p:cNvSpPr>
+            <a:spLocks noGrp="1"/>
+          </p:cNvSpPr>
+          <p:nvPr>
+            <p:ph type="title"/>
+          </p:nvPr>
+        </p:nvSpPr>
+        <p:spPr>
+          <a:xfrm>
+            <a:off x="838200" y="365125"/>
+            <a:ext cx="10515600" cy="904875"/>
+          </a:xfrm>
+        </p:spPr>
+        <p:txBody>
+          <a:bodyPr/>
+          <a:lstStyle/>
+          <a:p>
+            <a:r>
+              <a:rPr lang="en-GB" dirty="0" smtClean="0"/>
+              <a:t>Parts of new SQW object (</a:t>
+            </a:r>
+            <a:r>
+              <a:rPr lang="en-GB" dirty="0" err="1" smtClean="0"/>
+              <a:t>DND+pixels</a:t>
+            </a:r>
+            <a:r>
+              <a:rPr lang="en-GB" dirty="0" smtClean="0"/>
+              <a:t>):</a:t>
+            </a:r>
+            <a:endParaRPr lang="en-GB" dirty="0"/>
+          </a:p>
+        </p:txBody>
+      </p:sp>
+      <p:pic>
+        <p:nvPicPr>
+          <p:cNvPr id="4" name="Picture 3"/>
+          <p:cNvPicPr>
+            <a:picLocks noChangeAspect="1"/>
+          </p:cNvPicPr>
+          <p:nvPr/>
+        </p:nvPicPr>
+        <p:blipFill>
+          <a:blip r:embed="rId3"/>
+          <a:stretch>
+            <a:fillRect/>
+          </a:stretch>
+        </p:blipFill>
+        <p:spPr>
+          <a:xfrm>
+            <a:off x="504296" y="1193800"/>
+            <a:ext cx="1647032" cy="1193799"/>
           </a:xfrm>
           <a:prstGeom prst="rect">
             <a:avLst/>
@@ -13547,7 +13576,7 @@
         </p:nvSpPr>
         <p:spPr>
           <a:xfrm>
-            <a:off x="7977051" y="3126377"/>
+            <a:off x="7301971" y="3426356"/>
             <a:ext cx="3069771" cy="870857"/>
           </a:xfrm>
           <a:prstGeom prst="rect">
@@ -13580,20 +13609,12 @@
           <a:p>
             <a:pPr algn="ctr"/>
             <a:r>
-              <a:rPr lang="en-GB" dirty="0" err="1">
-                <a:solidFill>
-                  <a:schemeClr val="tx1"/>
-                </a:solidFill>
-              </a:rPr>
-              <a:t>n</a:t>
-            </a:r>
-            <a:r>
               <a:rPr lang="en-GB" dirty="0" err="1" smtClean="0">
                 <a:solidFill>
                   <a:schemeClr val="tx1"/>
                 </a:solidFill>
               </a:rPr>
-              <a:t>pix_to_pix_positions</a:t>
+              <a:t>npix_to_pix_transformation</a:t>
             </a:r>
             <a:endParaRPr lang="en-GB" dirty="0">
               <a:solidFill>
@@ -13860,11 +13881,7 @@
           <a:p>
             <a:r>
               <a:rPr lang="en-GB" b="1" dirty="0" err="1" smtClean="0"/>
-              <a:t>proj_</a:t>
-            </a:r>
-            <a:r>
-              <a:rPr lang="en-GB" b="1" dirty="0" err="1" smtClean="0"/>
-              <a:t>rec</a:t>
+              <a:t>proj_requested</a:t>
             </a:r>
             <a:r>
               <a:rPr lang="en-GB" dirty="0" smtClean="0"/>
@@ -13896,11 +13913,7 @@
             </a:r>
             <a:r>
               <a:rPr lang="en-GB" dirty="0" smtClean="0"/>
-              <a:t> </a:t>
-            </a:r>
-            <a:r>
-              <a:rPr lang="en-GB" dirty="0" smtClean="0"/>
-              <a:t>= </a:t>
+              <a:t> = </a:t>
             </a:r>
             <a:r>
               <a:rPr lang="en-GB" dirty="0" smtClean="0"/>
@@ -13908,11 +13921,15 @@
             </a:r>
             <a:r>
               <a:rPr lang="en-GB" b="1" dirty="0"/>
-              <a:t>proj_rec</a:t>
+              <a:t>proj_requested</a:t>
             </a:r>
             <a:r>
               <a:rPr lang="en-GB" dirty="0" smtClean="0"/>
-              <a:t>,axis_block1)</a:t>
+              <a:t>,axis_block1</a:t>
+            </a:r>
+            <a:r>
+              <a:rPr lang="en-GB" dirty="0" smtClean="0"/>
+              <a:t>)</a:t>
             </a:r>
           </a:p>
           <a:p>
@@ -13924,18 +13941,12 @@
               <a:rPr lang="en-GB" dirty="0" smtClean="0"/>
               <a:t>                 ---------------------------------------</a:t>
             </a:r>
-            <a:endParaRPr lang="en-GB" dirty="0" smtClean="0"/>
           </a:p>
           <a:p>
             <a:r>
               <a:rPr lang="en-GB" dirty="0" smtClean="0"/>
-              <a:t>	grid0 </a:t>
-            </a:r>
-            <a:r>
-              <a:rPr lang="en-GB" smtClean="0"/>
-              <a:t>= axis_block0.get_grid(proj0);</a:t>
-            </a:r>
-            <a:endParaRPr lang="en-GB" dirty="0" smtClean="0"/>
+              <a:t>	grid0 = axis_block0.get_grid(proj0);</a:t>
+            </a:r>
           </a:p>
           <a:p>
             <a:r>
@@ -13951,16 +13962,20 @@
               <a:t> </a:t>
             </a:r>
             <a:r>
-              <a:rPr lang="en-GB" b="1" dirty="0" err="1" smtClean="0"/>
-              <a:t>proj_rec</a:t>
-            </a:r>
-            <a:r>
-              <a:rPr lang="en-GB" dirty="0" err="1" smtClean="0"/>
+              <a:rPr lang="en-GB" b="1"/>
+              <a:t>proj_requested</a:t>
+            </a:r>
+            <a:r>
+              <a:rPr lang="en-GB" smtClean="0"/>
               <a:t>.convert_to_new_coord</a:t>
             </a:r>
             <a:r>
               <a:rPr lang="en-GB" dirty="0" smtClean="0"/>
-              <a:t>(grid0)</a:t>
+              <a:t>(grid0</a:t>
+            </a:r>
+            <a:r>
+              <a:rPr lang="en-GB" dirty="0" smtClean="0"/>
+              <a:t>)</a:t>
             </a:r>
           </a:p>
           <a:p>

</xml_diff>

<commit_message>
Re #485 Final remarks on GenProj design
Former-commit-id: 35ccad8d8f6e5af6b2968673b9c3957061ff7842
</commit_message>
<xml_diff>
--- a/documentation/Old_documentation/design_forV4/FilebasedObjects&GenProjection.pptx
+++ b/documentation/Old_documentation/design_forV4/FilebasedObjects&GenProjection.pptx
@@ -258,7 +258,7 @@
           <a:p>
             <a:fld id="{3F5A1AD9-98D0-4926-A662-690A33481C0C}" type="datetimeFigureOut">
               <a:rPr lang="en-GB" smtClean="0"/>
-              <a:t>22/01/2021</a:t>
+              <a:t>29/01/2021</a:t>
             </a:fld>
             <a:endParaRPr lang="en-GB"/>
           </a:p>
@@ -428,7 +428,7 @@
           <a:p>
             <a:fld id="{3F5A1AD9-98D0-4926-A662-690A33481C0C}" type="datetimeFigureOut">
               <a:rPr lang="en-GB" smtClean="0"/>
-              <a:t>22/01/2021</a:t>
+              <a:t>29/01/2021</a:t>
             </a:fld>
             <a:endParaRPr lang="en-GB"/>
           </a:p>
@@ -608,7 +608,7 @@
           <a:p>
             <a:fld id="{3F5A1AD9-98D0-4926-A662-690A33481C0C}" type="datetimeFigureOut">
               <a:rPr lang="en-GB" smtClean="0"/>
-              <a:t>22/01/2021</a:t>
+              <a:t>29/01/2021</a:t>
             </a:fld>
             <a:endParaRPr lang="en-GB"/>
           </a:p>
@@ -778,7 +778,7 @@
           <a:p>
             <a:fld id="{3F5A1AD9-98D0-4926-A662-690A33481C0C}" type="datetimeFigureOut">
               <a:rPr lang="en-GB" smtClean="0"/>
-              <a:t>22/01/2021</a:t>
+              <a:t>29/01/2021</a:t>
             </a:fld>
             <a:endParaRPr lang="en-GB"/>
           </a:p>
@@ -1024,7 +1024,7 @@
           <a:p>
             <a:fld id="{3F5A1AD9-98D0-4926-A662-690A33481C0C}" type="datetimeFigureOut">
               <a:rPr lang="en-GB" smtClean="0"/>
-              <a:t>22/01/2021</a:t>
+              <a:t>29/01/2021</a:t>
             </a:fld>
             <a:endParaRPr lang="en-GB"/>
           </a:p>
@@ -1256,7 +1256,7 @@
           <a:p>
             <a:fld id="{3F5A1AD9-98D0-4926-A662-690A33481C0C}" type="datetimeFigureOut">
               <a:rPr lang="en-GB" smtClean="0"/>
-              <a:t>22/01/2021</a:t>
+              <a:t>29/01/2021</a:t>
             </a:fld>
             <a:endParaRPr lang="en-GB"/>
           </a:p>
@@ -1623,7 +1623,7 @@
           <a:p>
             <a:fld id="{3F5A1AD9-98D0-4926-A662-690A33481C0C}" type="datetimeFigureOut">
               <a:rPr lang="en-GB" smtClean="0"/>
-              <a:t>22/01/2021</a:t>
+              <a:t>29/01/2021</a:t>
             </a:fld>
             <a:endParaRPr lang="en-GB"/>
           </a:p>
@@ -1741,7 +1741,7 @@
           <a:p>
             <a:fld id="{3F5A1AD9-98D0-4926-A662-690A33481C0C}" type="datetimeFigureOut">
               <a:rPr lang="en-GB" smtClean="0"/>
-              <a:t>22/01/2021</a:t>
+              <a:t>29/01/2021</a:t>
             </a:fld>
             <a:endParaRPr lang="en-GB"/>
           </a:p>
@@ -1836,7 +1836,7 @@
           <a:p>
             <a:fld id="{3F5A1AD9-98D0-4926-A662-690A33481C0C}" type="datetimeFigureOut">
               <a:rPr lang="en-GB" smtClean="0"/>
-              <a:t>22/01/2021</a:t>
+              <a:t>29/01/2021</a:t>
             </a:fld>
             <a:endParaRPr lang="en-GB"/>
           </a:p>
@@ -2113,7 +2113,7 @@
           <a:p>
             <a:fld id="{3F5A1AD9-98D0-4926-A662-690A33481C0C}" type="datetimeFigureOut">
               <a:rPr lang="en-GB" smtClean="0"/>
-              <a:t>22/01/2021</a:t>
+              <a:t>29/01/2021</a:t>
             </a:fld>
             <a:endParaRPr lang="en-GB"/>
           </a:p>
@@ -2366,7 +2366,7 @@
           <a:p>
             <a:fld id="{3F5A1AD9-98D0-4926-A662-690A33481C0C}" type="datetimeFigureOut">
               <a:rPr lang="en-GB" smtClean="0"/>
-              <a:t>22/01/2021</a:t>
+              <a:t>29/01/2021</a:t>
             </a:fld>
             <a:endParaRPr lang="en-GB"/>
           </a:p>
@@ -2579,7 +2579,7 @@
           <a:p>
             <a:fld id="{3F5A1AD9-98D0-4926-A662-690A33481C0C}" type="datetimeFigureOut">
               <a:rPr lang="en-GB" smtClean="0"/>
-              <a:t>22/01/2021</a:t>
+              <a:t>29/01/2021</a:t>
             </a:fld>
             <a:endParaRPr lang="en-GB"/>
           </a:p>
@@ -19431,6 +19431,36 @@
           </a:p>
         </p:txBody>
       </p:sp>
+      <p:cxnSp>
+        <p:nvCxnSpPr>
+          <p:cNvPr id="5" name="Straight Connector 4"/>
+          <p:cNvCxnSpPr/>
+          <p:nvPr/>
+        </p:nvCxnSpPr>
+        <p:spPr>
+          <a:xfrm>
+            <a:off x="10632452" y="3458031"/>
+            <a:ext cx="25631" cy="1017688"/>
+          </a:xfrm>
+          <a:prstGeom prst="line">
+            <a:avLst/>
+          </a:prstGeom>
+        </p:spPr>
+        <p:style>
+          <a:lnRef idx="1">
+            <a:schemeClr val="accent1"/>
+          </a:lnRef>
+          <a:fillRef idx="0">
+            <a:schemeClr val="accent1"/>
+          </a:fillRef>
+          <a:effectRef idx="0">
+            <a:schemeClr val="accent1"/>
+          </a:effectRef>
+          <a:fontRef idx="minor">
+            <a:schemeClr val="tx1"/>
+          </a:fontRef>
+        </p:style>
+      </p:cxnSp>
     </p:spTree>
     <p:extLst>
       <p:ext uri="{BB962C8B-B14F-4D97-AF65-F5344CB8AC3E}">
@@ -30262,11 +30292,7 @@
             <a:pPr algn="ctr"/>
             <a:r>
               <a:rPr lang="en-GB" dirty="0" err="1" smtClean="0"/>
-              <a:t>pix</a:t>
-            </a:r>
-            <a:r>
-              <a:rPr lang="en-GB" dirty="0" err="1" smtClean="0"/>
-              <a:t>_controller</a:t>
+              <a:t>pix_controller</a:t>
             </a:r>
             <a:r>
               <a:rPr lang="en-GB" dirty="0" smtClean="0"/>
@@ -30711,7 +30737,7 @@
         </p:nvSpPr>
         <p:spPr>
           <a:xfrm>
-            <a:off x="5016524" y="1321356"/>
+            <a:off x="5201850" y="1328376"/>
             <a:ext cx="6894217" cy="3693319"/>
           </a:xfrm>
           <a:prstGeom prst="rect">
@@ -30862,7 +30888,7 @@
           <a:p>
             <a:r>
               <a:rPr lang="en-GB" dirty="0" err="1" smtClean="0"/>
-              <a:t>npix_contributed</a:t>
+              <a:t>ind_pix_contributed</a:t>
             </a:r>
             <a:r>
               <a:rPr lang="en-GB" dirty="0" smtClean="0"/>
@@ -30884,6 +30910,7 @@
               <a:rPr lang="en-GB" dirty="0" smtClean="0"/>
               <a:t>)</a:t>
             </a:r>
+            <a:endParaRPr lang="en-GB" dirty="0" smtClean="0"/>
           </a:p>
           <a:p>
             <a:endParaRPr lang="en-GB" dirty="0"/>

</xml_diff>